<commit_message>
Add plots and graphs
</commit_message>
<xml_diff>
--- a/plots/production_mock.pptx
+++ b/plots/production_mock.pptx
@@ -104,6 +104,11 @@
       </a:defRPr>
     </a:lvl9pPr>
   </p:defaultTextStyle>
+  <p:extLst>
+    <p:ext uri="{EFAFB233-063F-42B5-8137-9DF3F51BA10A}">
+      <p15:sldGuideLst xmlns:p15="http://schemas.microsoft.com/office/powerpoint/2012/main"/>
+    </p:ext>
+  </p:extLst>
 </p:presentation>
 </file>
 
@@ -256,7 +261,7 @@
           <a:p>
             <a:fld id="{F0571932-2AEF-A74A-A195-B08B68835620}" type="datetimeFigureOut">
               <a:rPr lang="en-GB" smtClean="0"/>
-              <a:t>08/05/2020</a:t>
+              <a:t>14/05/2020</a:t>
             </a:fld>
             <a:endParaRPr lang="en-GB"/>
           </a:p>
@@ -456,7 +461,7 @@
           <a:p>
             <a:fld id="{F0571932-2AEF-A74A-A195-B08B68835620}" type="datetimeFigureOut">
               <a:rPr lang="en-GB" smtClean="0"/>
-              <a:t>08/05/2020</a:t>
+              <a:t>14/05/2020</a:t>
             </a:fld>
             <a:endParaRPr lang="en-GB"/>
           </a:p>
@@ -666,7 +671,7 @@
           <a:p>
             <a:fld id="{F0571932-2AEF-A74A-A195-B08B68835620}" type="datetimeFigureOut">
               <a:rPr lang="en-GB" smtClean="0"/>
-              <a:t>08/05/2020</a:t>
+              <a:t>14/05/2020</a:t>
             </a:fld>
             <a:endParaRPr lang="en-GB"/>
           </a:p>
@@ -866,7 +871,7 @@
           <a:p>
             <a:fld id="{F0571932-2AEF-A74A-A195-B08B68835620}" type="datetimeFigureOut">
               <a:rPr lang="en-GB" smtClean="0"/>
-              <a:t>08/05/2020</a:t>
+              <a:t>14/05/2020</a:t>
             </a:fld>
             <a:endParaRPr lang="en-GB"/>
           </a:p>
@@ -1142,7 +1147,7 @@
           <a:p>
             <a:fld id="{F0571932-2AEF-A74A-A195-B08B68835620}" type="datetimeFigureOut">
               <a:rPr lang="en-GB" smtClean="0"/>
-              <a:t>08/05/2020</a:t>
+              <a:t>14/05/2020</a:t>
             </a:fld>
             <a:endParaRPr lang="en-GB"/>
           </a:p>
@@ -1410,7 +1415,7 @@
           <a:p>
             <a:fld id="{F0571932-2AEF-A74A-A195-B08B68835620}" type="datetimeFigureOut">
               <a:rPr lang="en-GB" smtClean="0"/>
-              <a:t>08/05/2020</a:t>
+              <a:t>14/05/2020</a:t>
             </a:fld>
             <a:endParaRPr lang="en-GB"/>
           </a:p>
@@ -1825,7 +1830,7 @@
           <a:p>
             <a:fld id="{F0571932-2AEF-A74A-A195-B08B68835620}" type="datetimeFigureOut">
               <a:rPr lang="en-GB" smtClean="0"/>
-              <a:t>08/05/2020</a:t>
+              <a:t>14/05/2020</a:t>
             </a:fld>
             <a:endParaRPr lang="en-GB"/>
           </a:p>
@@ -1967,7 +1972,7 @@
           <a:p>
             <a:fld id="{F0571932-2AEF-A74A-A195-B08B68835620}" type="datetimeFigureOut">
               <a:rPr lang="en-GB" smtClean="0"/>
-              <a:t>08/05/2020</a:t>
+              <a:t>14/05/2020</a:t>
             </a:fld>
             <a:endParaRPr lang="en-GB"/>
           </a:p>
@@ -2080,7 +2085,7 @@
           <a:p>
             <a:fld id="{F0571932-2AEF-A74A-A195-B08B68835620}" type="datetimeFigureOut">
               <a:rPr lang="en-GB" smtClean="0"/>
-              <a:t>08/05/2020</a:t>
+              <a:t>14/05/2020</a:t>
             </a:fld>
             <a:endParaRPr lang="en-GB"/>
           </a:p>
@@ -2393,7 +2398,7 @@
           <a:p>
             <a:fld id="{F0571932-2AEF-A74A-A195-B08B68835620}" type="datetimeFigureOut">
               <a:rPr lang="en-GB" smtClean="0"/>
-              <a:t>08/05/2020</a:t>
+              <a:t>14/05/2020</a:t>
             </a:fld>
             <a:endParaRPr lang="en-GB"/>
           </a:p>
@@ -2682,7 +2687,7 @@
           <a:p>
             <a:fld id="{F0571932-2AEF-A74A-A195-B08B68835620}" type="datetimeFigureOut">
               <a:rPr lang="en-GB" smtClean="0"/>
-              <a:t>08/05/2020</a:t>
+              <a:t>14/05/2020</a:t>
             </a:fld>
             <a:endParaRPr lang="en-GB"/>
           </a:p>
@@ -2925,7 +2930,7 @@
           <a:p>
             <a:fld id="{F0571932-2AEF-A74A-A195-B08B68835620}" type="datetimeFigureOut">
               <a:rPr lang="en-GB" smtClean="0"/>
-              <a:t>08/05/2020</a:t>
+              <a:t>14/05/2020</a:t>
             </a:fld>
             <a:endParaRPr lang="en-GB"/>
           </a:p>
@@ -3342,6 +3347,51 @@
           <a:chExt cx="0" cy="0"/>
         </a:xfrm>
       </p:grpSpPr>
+      <p:cxnSp>
+        <p:nvCxnSpPr>
+          <p:cNvPr id="32" name="Straight Connector 31">
+            <a:extLst>
+              <a:ext uri="{FF2B5EF4-FFF2-40B4-BE49-F238E27FC236}">
+                <a16:creationId xmlns:a16="http://schemas.microsoft.com/office/drawing/2014/main" id="{81287972-C414-9047-9528-83AAE6D5C601}"/>
+              </a:ext>
+            </a:extLst>
+          </p:cNvPr>
+          <p:cNvCxnSpPr>
+            <a:cxnSpLocks/>
+            <a:stCxn id="4" idx="0"/>
+            <a:endCxn id="14" idx="2"/>
+          </p:cNvCxnSpPr>
+          <p:nvPr/>
+        </p:nvCxnSpPr>
+        <p:spPr>
+          <a:xfrm flipH="1">
+            <a:off x="3419987" y="168947"/>
+            <a:ext cx="7" cy="6519481"/>
+          </a:xfrm>
+          <a:prstGeom prst="line">
+            <a:avLst/>
+          </a:prstGeom>
+          <a:ln w="19050">
+            <a:solidFill>
+              <a:schemeClr val="tx1"/>
+            </a:solidFill>
+          </a:ln>
+        </p:spPr>
+        <p:style>
+          <a:lnRef idx="1">
+            <a:schemeClr val="accent1"/>
+          </a:lnRef>
+          <a:fillRef idx="0">
+            <a:schemeClr val="accent1"/>
+          </a:fillRef>
+          <a:effectRef idx="0">
+            <a:schemeClr val="accent1"/>
+          </a:effectRef>
+          <a:fontRef idx="minor">
+            <a:schemeClr val="tx1"/>
+          </a:fontRef>
+        </p:style>
+      </p:cxnSp>
       <p:sp>
         <p:nvSpPr>
           <p:cNvPr id="4" name="Rounded Rectangle 3">
@@ -3356,13 +3406,17 @@
         </p:nvSpPr>
         <p:spPr>
           <a:xfrm>
-            <a:off x="1197429" y="533400"/>
-            <a:ext cx="2130387" cy="575872"/>
+            <a:off x="2395571" y="168947"/>
+            <a:ext cx="2048845" cy="467666"/>
           </a:xfrm>
           <a:prstGeom prst="roundRect">
             <a:avLst/>
           </a:prstGeom>
-          <a:noFill/>
+          <a:solidFill>
+            <a:schemeClr val="bg1">
+              <a:lumMod val="95000"/>
+            </a:schemeClr>
+          </a:solidFill>
           <a:ln w="25400">
             <a:solidFill>
               <a:schemeClr val="tx1"/>
@@ -3391,7 +3445,7 @@
           <a:p>
             <a:pPr algn="ctr"/>
             <a:r>
-              <a:rPr lang="en-GB" noProof="1">
+              <a:rPr lang="en-GB" sz="1400" noProof="1">
                 <a:solidFill>
                   <a:schemeClr val="tx1">
                     <a:lumMod val="85000"/>
@@ -3405,7 +3459,7 @@
           <a:p>
             <a:pPr algn="ctr"/>
             <a:r>
-              <a:rPr lang="en-GB" sz="1600" noProof="1">
+              <a:rPr lang="en-GB" sz="1100" noProof="1">
                 <a:solidFill>
                   <a:schemeClr val="tx1">
                     <a:lumMod val="85000"/>
@@ -3432,13 +3486,17 @@
         </p:nvSpPr>
         <p:spPr>
           <a:xfrm>
-            <a:off x="3823206" y="533400"/>
-            <a:ext cx="2130387" cy="575872"/>
+            <a:off x="2395566" y="767957"/>
+            <a:ext cx="2048845" cy="467666"/>
           </a:xfrm>
           <a:prstGeom prst="roundRect">
             <a:avLst/>
           </a:prstGeom>
-          <a:noFill/>
+          <a:solidFill>
+            <a:schemeClr val="bg1">
+              <a:lumMod val="95000"/>
+            </a:schemeClr>
+          </a:solidFill>
           <a:ln w="25400">
             <a:solidFill>
               <a:schemeClr val="tx1"/>
@@ -3467,7 +3525,7 @@
           <a:p>
             <a:pPr algn="ctr"/>
             <a:r>
-              <a:rPr lang="en-GB" noProof="1">
+              <a:rPr lang="en-GB" sz="1400" noProof="1">
                 <a:solidFill>
                   <a:schemeClr val="tx1">
                     <a:lumMod val="85000"/>
@@ -3481,7 +3539,7 @@
           <a:p>
             <a:pPr algn="ctr"/>
             <a:r>
-              <a:rPr lang="en-GB" sz="1600" noProof="1">
+              <a:rPr lang="en-GB" sz="1100" noProof="1">
                 <a:solidFill>
                   <a:schemeClr val="tx1">
                     <a:lumMod val="85000"/>
@@ -3489,7 +3547,2082 @@
                   </a:schemeClr>
                 </a:solidFill>
               </a:rPr>
-              <a:t>1 noeud – 16 threads</a:t>
+              <a:t>1 noeud – 1 thread</a:t>
+            </a:r>
+          </a:p>
+        </p:txBody>
+      </p:sp>
+      <p:sp>
+        <p:nvSpPr>
+          <p:cNvPr id="7" name="Rounded Rectangle 6">
+            <a:extLst>
+              <a:ext uri="{FF2B5EF4-FFF2-40B4-BE49-F238E27FC236}">
+                <a16:creationId xmlns:a16="http://schemas.microsoft.com/office/drawing/2014/main" id="{C7A252A9-6045-6740-A98F-46632C6036FE}"/>
+              </a:ext>
+            </a:extLst>
+          </p:cNvPr>
+          <p:cNvSpPr/>
+          <p:nvPr/>
+        </p:nvSpPr>
+        <p:spPr>
+          <a:xfrm>
+            <a:off x="2395567" y="1695987"/>
+            <a:ext cx="2048845" cy="467666"/>
+          </a:xfrm>
+          <a:prstGeom prst="roundRect">
+            <a:avLst/>
+          </a:prstGeom>
+          <a:solidFill>
+            <a:schemeClr val="bg1">
+              <a:lumMod val="95000"/>
+            </a:schemeClr>
+          </a:solidFill>
+          <a:ln w="25400">
+            <a:solidFill>
+              <a:schemeClr val="tx1"/>
+            </a:solidFill>
+          </a:ln>
+        </p:spPr>
+        <p:style>
+          <a:lnRef idx="2">
+            <a:schemeClr val="accent1">
+              <a:shade val="50000"/>
+            </a:schemeClr>
+          </a:lnRef>
+          <a:fillRef idx="1">
+            <a:schemeClr val="accent1"/>
+          </a:fillRef>
+          <a:effectRef idx="0">
+            <a:schemeClr val="accent1"/>
+          </a:effectRef>
+          <a:fontRef idx="minor">
+            <a:schemeClr val="lt1"/>
+          </a:fontRef>
+        </p:style>
+        <p:txBody>
+          <a:bodyPr rtlCol="0" anchor="ctr"/>
+          <a:lstStyle/>
+          <a:p>
+            <a:pPr algn="ctr"/>
+            <a:r>
+              <a:rPr lang="en-GB" sz="1400" noProof="1">
+                <a:solidFill>
+                  <a:schemeClr val="tx1">
+                    <a:lumMod val="85000"/>
+                    <a:lumOff val="15000"/>
+                  </a:schemeClr>
+                </a:solidFill>
+              </a:rPr>
+              <a:t>make_boxes.py</a:t>
+            </a:r>
+          </a:p>
+          <a:p>
+            <a:pPr algn="ctr"/>
+            <a:r>
+              <a:rPr lang="en-GB" sz="1100" noProof="1">
+                <a:solidFill>
+                  <a:schemeClr val="tx1">
+                    <a:lumMod val="85000"/>
+                    <a:lumOff val="15000"/>
+                  </a:schemeClr>
+                </a:solidFill>
+              </a:rPr>
+              <a:t>1 noeud – 64 threads</a:t>
+            </a:r>
+          </a:p>
+        </p:txBody>
+      </p:sp>
+      <p:sp>
+        <p:nvSpPr>
+          <p:cNvPr id="8" name="Rounded Rectangle 7">
+            <a:extLst>
+              <a:ext uri="{FF2B5EF4-FFF2-40B4-BE49-F238E27FC236}">
+                <a16:creationId xmlns:a16="http://schemas.microsoft.com/office/drawing/2014/main" id="{229330C5-AD1E-4641-A59D-A4064716147D}"/>
+              </a:ext>
+            </a:extLst>
+          </p:cNvPr>
+          <p:cNvSpPr/>
+          <p:nvPr/>
+        </p:nvSpPr>
+        <p:spPr>
+          <a:xfrm>
+            <a:off x="2395567" y="2294997"/>
+            <a:ext cx="2048845" cy="467666"/>
+          </a:xfrm>
+          <a:prstGeom prst="roundRect">
+            <a:avLst/>
+          </a:prstGeom>
+          <a:solidFill>
+            <a:schemeClr val="bg1">
+              <a:lumMod val="95000"/>
+            </a:schemeClr>
+          </a:solidFill>
+          <a:ln w="25400">
+            <a:solidFill>
+              <a:schemeClr val="tx1"/>
+            </a:solidFill>
+          </a:ln>
+        </p:spPr>
+        <p:style>
+          <a:lnRef idx="2">
+            <a:schemeClr val="accent1">
+              <a:shade val="50000"/>
+            </a:schemeClr>
+          </a:lnRef>
+          <a:fillRef idx="1">
+            <a:schemeClr val="accent1"/>
+          </a:fillRef>
+          <a:effectRef idx="0">
+            <a:schemeClr val="accent1"/>
+          </a:effectRef>
+          <a:fontRef idx="minor">
+            <a:schemeClr val="lt1"/>
+          </a:fontRef>
+        </p:style>
+        <p:txBody>
+          <a:bodyPr rtlCol="0" anchor="ctr"/>
+          <a:lstStyle/>
+          <a:p>
+            <a:pPr algn="ctr"/>
+            <a:r>
+              <a:rPr lang="en-GB" sz="1400" noProof="1">
+                <a:solidFill>
+                  <a:schemeClr val="tx1">
+                    <a:lumMod val="85000"/>
+                    <a:lumOff val="15000"/>
+                  </a:schemeClr>
+                </a:solidFill>
+              </a:rPr>
+              <a:t>draw_qso.py</a:t>
+            </a:r>
+          </a:p>
+          <a:p>
+            <a:pPr algn="ctr"/>
+            <a:r>
+              <a:rPr lang="en-GB" sz="1100" noProof="1">
+                <a:solidFill>
+                  <a:schemeClr val="tx1">
+                    <a:lumMod val="85000"/>
+                    <a:lumOff val="15000"/>
+                  </a:schemeClr>
+                </a:solidFill>
+              </a:rPr>
+              <a:t>16 noeud – 512 threads</a:t>
+            </a:r>
+          </a:p>
+        </p:txBody>
+      </p:sp>
+      <p:sp>
+        <p:nvSpPr>
+          <p:cNvPr id="9" name="Rounded Rectangle 8">
+            <a:extLst>
+              <a:ext uri="{FF2B5EF4-FFF2-40B4-BE49-F238E27FC236}">
+                <a16:creationId xmlns:a16="http://schemas.microsoft.com/office/drawing/2014/main" id="{EB1B5B13-5CAD-E14F-B7F6-DDFD8046167D}"/>
+              </a:ext>
+            </a:extLst>
+          </p:cNvPr>
+          <p:cNvSpPr/>
+          <p:nvPr/>
+        </p:nvSpPr>
+        <p:spPr>
+          <a:xfrm>
+            <a:off x="2395567" y="2894902"/>
+            <a:ext cx="2048845" cy="467666"/>
+          </a:xfrm>
+          <a:prstGeom prst="roundRect">
+            <a:avLst/>
+          </a:prstGeom>
+          <a:solidFill>
+            <a:schemeClr val="bg1">
+              <a:lumMod val="95000"/>
+            </a:schemeClr>
+          </a:solidFill>
+          <a:ln w="25400">
+            <a:solidFill>
+              <a:schemeClr val="tx1"/>
+            </a:solidFill>
+          </a:ln>
+        </p:spPr>
+        <p:style>
+          <a:lnRef idx="2">
+            <a:schemeClr val="accent1">
+              <a:shade val="50000"/>
+            </a:schemeClr>
+          </a:lnRef>
+          <a:fillRef idx="1">
+            <a:schemeClr val="accent1"/>
+          </a:fillRef>
+          <a:effectRef idx="0">
+            <a:schemeClr val="accent1"/>
+          </a:effectRef>
+          <a:fontRef idx="minor">
+            <a:schemeClr val="lt1"/>
+          </a:fontRef>
+        </p:style>
+        <p:txBody>
+          <a:bodyPr rtlCol="0" anchor="ctr"/>
+          <a:lstStyle/>
+          <a:p>
+            <a:pPr algn="ctr"/>
+            <a:r>
+              <a:rPr lang="en-GB" sz="1400" noProof="1">
+                <a:solidFill>
+                  <a:schemeClr val="tx1">
+                    <a:lumMod val="85000"/>
+                    <a:lumOff val="15000"/>
+                  </a:schemeClr>
+                </a:solidFill>
+              </a:rPr>
+              <a:t>make_spectra.py</a:t>
+            </a:r>
+          </a:p>
+          <a:p>
+            <a:pPr algn="ctr"/>
+            <a:r>
+              <a:rPr lang="en-GB" sz="1100" noProof="1">
+                <a:solidFill>
+                  <a:schemeClr val="tx1">
+                    <a:lumMod val="85000"/>
+                    <a:lumOff val="15000"/>
+                  </a:schemeClr>
+                </a:solidFill>
+              </a:rPr>
+              <a:t>16 noeud – 512 threads</a:t>
+            </a:r>
+          </a:p>
+        </p:txBody>
+      </p:sp>
+      <p:sp>
+        <p:nvSpPr>
+          <p:cNvPr id="10" name="Rounded Rectangle 9">
+            <a:extLst>
+              <a:ext uri="{FF2B5EF4-FFF2-40B4-BE49-F238E27FC236}">
+                <a16:creationId xmlns:a16="http://schemas.microsoft.com/office/drawing/2014/main" id="{5A4A04AD-4E64-DC43-9D95-8B4FB46A3FD7}"/>
+              </a:ext>
+            </a:extLst>
+          </p:cNvPr>
+          <p:cNvSpPr/>
+          <p:nvPr/>
+        </p:nvSpPr>
+        <p:spPr>
+          <a:xfrm>
+            <a:off x="2395566" y="3494807"/>
+            <a:ext cx="2048845" cy="467666"/>
+          </a:xfrm>
+          <a:prstGeom prst="roundRect">
+            <a:avLst/>
+          </a:prstGeom>
+          <a:solidFill>
+            <a:schemeClr val="bg1">
+              <a:lumMod val="95000"/>
+            </a:schemeClr>
+          </a:solidFill>
+          <a:ln w="25400">
+            <a:solidFill>
+              <a:schemeClr val="tx1"/>
+            </a:solidFill>
+          </a:ln>
+        </p:spPr>
+        <p:style>
+          <a:lnRef idx="2">
+            <a:schemeClr val="accent1">
+              <a:shade val="50000"/>
+            </a:schemeClr>
+          </a:lnRef>
+          <a:fillRef idx="1">
+            <a:schemeClr val="accent1"/>
+          </a:fillRef>
+          <a:effectRef idx="0">
+            <a:schemeClr val="accent1"/>
+          </a:effectRef>
+          <a:fontRef idx="minor">
+            <a:schemeClr val="lt1"/>
+          </a:fontRef>
+        </p:style>
+        <p:txBody>
+          <a:bodyPr rtlCol="0" anchor="ctr"/>
+          <a:lstStyle/>
+          <a:p>
+            <a:pPr algn="ctr"/>
+            <a:r>
+              <a:rPr lang="en-GB" sz="1400" noProof="1">
+                <a:solidFill>
+                  <a:schemeClr val="tx1">
+                    <a:lumMod val="85000"/>
+                    <a:lumOff val="15000"/>
+                  </a:schemeClr>
+                </a:solidFill>
+              </a:rPr>
+              <a:t>merge_spectra.py</a:t>
+            </a:r>
+          </a:p>
+          <a:p>
+            <a:pPr algn="ctr"/>
+            <a:r>
+              <a:rPr lang="en-GB" sz="1100" noProof="1">
+                <a:solidFill>
+                  <a:schemeClr val="tx1">
+                    <a:lumMod val="85000"/>
+                    <a:lumOff val="15000"/>
+                  </a:schemeClr>
+                </a:solidFill>
+              </a:rPr>
+              <a:t>16 noeud – 512 threads</a:t>
+            </a:r>
+          </a:p>
+        </p:txBody>
+      </p:sp>
+      <p:sp>
+        <p:nvSpPr>
+          <p:cNvPr id="11" name="Rounded Rectangle 10">
+            <a:extLst>
+              <a:ext uri="{FF2B5EF4-FFF2-40B4-BE49-F238E27FC236}">
+                <a16:creationId xmlns:a16="http://schemas.microsoft.com/office/drawing/2014/main" id="{587907E2-F81C-D545-983D-F11D125F5791}"/>
+              </a:ext>
+            </a:extLst>
+          </p:cNvPr>
+          <p:cNvSpPr/>
+          <p:nvPr/>
+        </p:nvSpPr>
+        <p:spPr>
+          <a:xfrm>
+            <a:off x="2395566" y="4416552"/>
+            <a:ext cx="2048845" cy="467666"/>
+          </a:xfrm>
+          <a:prstGeom prst="roundRect">
+            <a:avLst/>
+          </a:prstGeom>
+          <a:solidFill>
+            <a:schemeClr val="bg1">
+              <a:lumMod val="95000"/>
+            </a:schemeClr>
+          </a:solidFill>
+          <a:ln w="25400">
+            <a:solidFill>
+              <a:schemeClr val="tx1"/>
+            </a:solidFill>
+          </a:ln>
+        </p:spPr>
+        <p:style>
+          <a:lnRef idx="2">
+            <a:schemeClr val="accent1">
+              <a:shade val="50000"/>
+            </a:schemeClr>
+          </a:lnRef>
+          <a:fillRef idx="1">
+            <a:schemeClr val="accent1"/>
+          </a:fillRef>
+          <a:effectRef idx="0">
+            <a:schemeClr val="accent1"/>
+          </a:effectRef>
+          <a:fontRef idx="minor">
+            <a:schemeClr val="lt1"/>
+          </a:fontRef>
+        </p:style>
+        <p:txBody>
+          <a:bodyPr rtlCol="0" anchor="ctr"/>
+          <a:lstStyle/>
+          <a:p>
+            <a:pPr algn="ctr"/>
+            <a:r>
+              <a:rPr lang="en-GB" sz="1400" noProof="1">
+                <a:solidFill>
+                  <a:schemeClr val="tx1">
+                    <a:lumMod val="85000"/>
+                    <a:lumOff val="15000"/>
+                  </a:schemeClr>
+                </a:solidFill>
+              </a:rPr>
+              <a:t>merge_qso.py</a:t>
+            </a:r>
+          </a:p>
+          <a:p>
+            <a:pPr algn="ctr"/>
+            <a:r>
+              <a:rPr lang="en-GB" sz="1100" noProof="1">
+                <a:solidFill>
+                  <a:schemeClr val="tx1">
+                    <a:lumMod val="85000"/>
+                    <a:lumOff val="15000"/>
+                  </a:schemeClr>
+                </a:solidFill>
+              </a:rPr>
+              <a:t>1 noeud – 1 threads</a:t>
+            </a:r>
+          </a:p>
+        </p:txBody>
+      </p:sp>
+      <p:sp>
+        <p:nvSpPr>
+          <p:cNvPr id="12" name="Rounded Rectangle 11">
+            <a:extLst>
+              <a:ext uri="{FF2B5EF4-FFF2-40B4-BE49-F238E27FC236}">
+                <a16:creationId xmlns:a16="http://schemas.microsoft.com/office/drawing/2014/main" id="{2B45C444-ABF6-F649-BFEE-34D962B6956E}"/>
+              </a:ext>
+            </a:extLst>
+          </p:cNvPr>
+          <p:cNvSpPr/>
+          <p:nvPr/>
+        </p:nvSpPr>
+        <p:spPr>
+          <a:xfrm>
+            <a:off x="2395566" y="5021847"/>
+            <a:ext cx="2048845" cy="467666"/>
+          </a:xfrm>
+          <a:prstGeom prst="roundRect">
+            <a:avLst/>
+          </a:prstGeom>
+          <a:solidFill>
+            <a:schemeClr val="bg1">
+              <a:lumMod val="95000"/>
+            </a:schemeClr>
+          </a:solidFill>
+          <a:ln w="25400">
+            <a:solidFill>
+              <a:schemeClr val="tx1"/>
+            </a:solidFill>
+          </a:ln>
+        </p:spPr>
+        <p:style>
+          <a:lnRef idx="2">
+            <a:schemeClr val="accent1">
+              <a:shade val="50000"/>
+            </a:schemeClr>
+          </a:lnRef>
+          <a:fillRef idx="1">
+            <a:schemeClr val="accent1"/>
+          </a:fillRef>
+          <a:effectRef idx="0">
+            <a:schemeClr val="accent1"/>
+          </a:effectRef>
+          <a:fontRef idx="minor">
+            <a:schemeClr val="lt1"/>
+          </a:fontRef>
+        </p:style>
+        <p:txBody>
+          <a:bodyPr rtlCol="0" anchor="ctr"/>
+          <a:lstStyle/>
+          <a:p>
+            <a:pPr algn="ctr"/>
+            <a:r>
+              <a:rPr lang="en-GB" sz="1400" noProof="1">
+                <a:solidFill>
+                  <a:schemeClr val="tx1">
+                    <a:lumMod val="85000"/>
+                    <a:lumOff val="15000"/>
+                  </a:schemeClr>
+                </a:solidFill>
+              </a:rPr>
+              <a:t>dla_saclay.py</a:t>
+            </a:r>
+          </a:p>
+          <a:p>
+            <a:pPr algn="ctr"/>
+            <a:r>
+              <a:rPr lang="en-GB" sz="1100" noProof="1">
+                <a:solidFill>
+                  <a:schemeClr val="tx1">
+                    <a:lumMod val="85000"/>
+                    <a:lumOff val="15000"/>
+                  </a:schemeClr>
+                </a:solidFill>
+              </a:rPr>
+              <a:t>1 noeud – 7 threads</a:t>
+            </a:r>
+          </a:p>
+        </p:txBody>
+      </p:sp>
+      <p:sp>
+        <p:nvSpPr>
+          <p:cNvPr id="13" name="Rounded Rectangle 12">
+            <a:extLst>
+              <a:ext uri="{FF2B5EF4-FFF2-40B4-BE49-F238E27FC236}">
+                <a16:creationId xmlns:a16="http://schemas.microsoft.com/office/drawing/2014/main" id="{BA52D25F-76EE-DB43-BD7D-1F14D3C234B6}"/>
+              </a:ext>
+            </a:extLst>
+          </p:cNvPr>
+          <p:cNvSpPr/>
+          <p:nvPr/>
+        </p:nvSpPr>
+        <p:spPr>
+          <a:xfrm>
+            <a:off x="2395565" y="5621752"/>
+            <a:ext cx="2048845" cy="467666"/>
+          </a:xfrm>
+          <a:prstGeom prst="roundRect">
+            <a:avLst/>
+          </a:prstGeom>
+          <a:solidFill>
+            <a:schemeClr val="bg1">
+              <a:lumMod val="95000"/>
+            </a:schemeClr>
+          </a:solidFill>
+          <a:ln w="25400">
+            <a:solidFill>
+              <a:schemeClr val="tx1"/>
+            </a:solidFill>
+          </a:ln>
+        </p:spPr>
+        <p:style>
+          <a:lnRef idx="2">
+            <a:schemeClr val="accent1">
+              <a:shade val="50000"/>
+            </a:schemeClr>
+          </a:lnRef>
+          <a:fillRef idx="1">
+            <a:schemeClr val="accent1"/>
+          </a:fillRef>
+          <a:effectRef idx="0">
+            <a:schemeClr val="accent1"/>
+          </a:effectRef>
+          <a:fontRef idx="minor">
+            <a:schemeClr val="lt1"/>
+          </a:fontRef>
+        </p:style>
+        <p:txBody>
+          <a:bodyPr rtlCol="0" anchor="ctr"/>
+          <a:lstStyle/>
+          <a:p>
+            <a:pPr algn="ctr"/>
+            <a:r>
+              <a:rPr lang="en-GB" sz="1400" noProof="1">
+                <a:solidFill>
+                  <a:schemeClr val="tx1">
+                    <a:lumMod val="85000"/>
+                    <a:lumOff val="15000"/>
+                  </a:schemeClr>
+                </a:solidFill>
+              </a:rPr>
+              <a:t>merge_dla.py</a:t>
+            </a:r>
+          </a:p>
+          <a:p>
+            <a:pPr algn="ctr"/>
+            <a:r>
+              <a:rPr lang="en-GB" sz="1100" noProof="1">
+                <a:solidFill>
+                  <a:schemeClr val="tx1">
+                    <a:lumMod val="85000"/>
+                    <a:lumOff val="15000"/>
+                  </a:schemeClr>
+                </a:solidFill>
+              </a:rPr>
+              <a:t>1 noeud – 1 threads</a:t>
+            </a:r>
+          </a:p>
+        </p:txBody>
+      </p:sp>
+      <p:sp>
+        <p:nvSpPr>
+          <p:cNvPr id="14" name="Rounded Rectangle 13">
+            <a:extLst>
+              <a:ext uri="{FF2B5EF4-FFF2-40B4-BE49-F238E27FC236}">
+                <a16:creationId xmlns:a16="http://schemas.microsoft.com/office/drawing/2014/main" id="{F52501CE-5CDE-7D4F-BE4B-106491D68F8E}"/>
+              </a:ext>
+            </a:extLst>
+          </p:cNvPr>
+          <p:cNvSpPr/>
+          <p:nvPr/>
+        </p:nvSpPr>
+        <p:spPr>
+          <a:xfrm>
+            <a:off x="2395564" y="6220762"/>
+            <a:ext cx="2048845" cy="467666"/>
+          </a:xfrm>
+          <a:prstGeom prst="roundRect">
+            <a:avLst/>
+          </a:prstGeom>
+          <a:solidFill>
+            <a:schemeClr val="bg1">
+              <a:lumMod val="95000"/>
+            </a:schemeClr>
+          </a:solidFill>
+          <a:ln w="25400">
+            <a:solidFill>
+              <a:schemeClr val="tx1"/>
+            </a:solidFill>
+          </a:ln>
+        </p:spPr>
+        <p:style>
+          <a:lnRef idx="2">
+            <a:schemeClr val="accent1">
+              <a:shade val="50000"/>
+            </a:schemeClr>
+          </a:lnRef>
+          <a:fillRef idx="1">
+            <a:schemeClr val="accent1"/>
+          </a:fillRef>
+          <a:effectRef idx="0">
+            <a:schemeClr val="accent1"/>
+          </a:effectRef>
+          <a:fontRef idx="minor">
+            <a:schemeClr val="lt1"/>
+          </a:fontRef>
+        </p:style>
+        <p:txBody>
+          <a:bodyPr rtlCol="0" anchor="ctr"/>
+          <a:lstStyle/>
+          <a:p>
+            <a:pPr algn="ctr"/>
+            <a:r>
+              <a:rPr lang="en-GB" sz="1400" noProof="1">
+                <a:solidFill>
+                  <a:schemeClr val="tx1">
+                    <a:lumMod val="85000"/>
+                    <a:lumOff val="15000"/>
+                  </a:schemeClr>
+                </a:solidFill>
+              </a:rPr>
+              <a:t>make_transmissions.py</a:t>
+            </a:r>
+          </a:p>
+          <a:p>
+            <a:pPr algn="ctr"/>
+            <a:r>
+              <a:rPr lang="en-GB" sz="1100" noProof="1">
+                <a:solidFill>
+                  <a:schemeClr val="tx1">
+                    <a:lumMod val="85000"/>
+                    <a:lumOff val="15000"/>
+                  </a:schemeClr>
+                </a:solidFill>
+              </a:rPr>
+              <a:t>1 noeud – 1 threads</a:t>
+            </a:r>
+          </a:p>
+        </p:txBody>
+      </p:sp>
+      <p:sp>
+        <p:nvSpPr>
+          <p:cNvPr id="16" name="Right Brace 15">
+            <a:extLst>
+              <a:ext uri="{FF2B5EF4-FFF2-40B4-BE49-F238E27FC236}">
+                <a16:creationId xmlns:a16="http://schemas.microsoft.com/office/drawing/2014/main" id="{24A293DA-40B5-9245-9F12-7986626DBBE4}"/>
+              </a:ext>
+            </a:extLst>
+          </p:cNvPr>
+          <p:cNvSpPr/>
+          <p:nvPr/>
+        </p:nvSpPr>
+        <p:spPr>
+          <a:xfrm>
+            <a:off x="5455831" y="168947"/>
+            <a:ext cx="267628" cy="1066676"/>
+          </a:xfrm>
+          <a:prstGeom prst="rightBrace">
+            <a:avLst/>
+          </a:prstGeom>
+          <a:ln w="19050">
+            <a:solidFill>
+              <a:schemeClr val="tx1"/>
+            </a:solidFill>
+          </a:ln>
+        </p:spPr>
+        <p:style>
+          <a:lnRef idx="1">
+            <a:schemeClr val="accent1"/>
+          </a:lnRef>
+          <a:fillRef idx="0">
+            <a:schemeClr val="accent1"/>
+          </a:fillRef>
+          <a:effectRef idx="0">
+            <a:schemeClr val="accent1"/>
+          </a:effectRef>
+          <a:fontRef idx="minor">
+            <a:schemeClr val="tx1"/>
+          </a:fontRef>
+        </p:style>
+        <p:txBody>
+          <a:bodyPr rtlCol="0" anchor="ctr"/>
+          <a:lstStyle/>
+          <a:p>
+            <a:pPr algn="ctr"/>
+            <a:endParaRPr lang="en-GB"/>
+          </a:p>
+        </p:txBody>
+      </p:sp>
+      <p:sp>
+        <p:nvSpPr>
+          <p:cNvPr id="18" name="Right Brace 17">
+            <a:extLst>
+              <a:ext uri="{FF2B5EF4-FFF2-40B4-BE49-F238E27FC236}">
+                <a16:creationId xmlns:a16="http://schemas.microsoft.com/office/drawing/2014/main" id="{E182CED6-254C-4D4E-954A-E504FBD4258C}"/>
+              </a:ext>
+            </a:extLst>
+          </p:cNvPr>
+          <p:cNvSpPr/>
+          <p:nvPr/>
+        </p:nvSpPr>
+        <p:spPr>
+          <a:xfrm>
+            <a:off x="5455831" y="1695987"/>
+            <a:ext cx="267628" cy="2266486"/>
+          </a:xfrm>
+          <a:prstGeom prst="rightBrace">
+            <a:avLst/>
+          </a:prstGeom>
+          <a:ln w="19050">
+            <a:solidFill>
+              <a:schemeClr val="tx1"/>
+            </a:solidFill>
+          </a:ln>
+        </p:spPr>
+        <p:style>
+          <a:lnRef idx="1">
+            <a:schemeClr val="accent1"/>
+          </a:lnRef>
+          <a:fillRef idx="0">
+            <a:schemeClr val="accent1"/>
+          </a:fillRef>
+          <a:effectRef idx="0">
+            <a:schemeClr val="accent1"/>
+          </a:effectRef>
+          <a:fontRef idx="minor">
+            <a:schemeClr val="tx1"/>
+          </a:fontRef>
+        </p:style>
+        <p:txBody>
+          <a:bodyPr rtlCol="0" anchor="ctr"/>
+          <a:lstStyle/>
+          <a:p>
+            <a:pPr algn="ctr"/>
+            <a:endParaRPr lang="en-GB"/>
+          </a:p>
+        </p:txBody>
+      </p:sp>
+      <p:sp>
+        <p:nvSpPr>
+          <p:cNvPr id="21" name="TextBox 20">
+            <a:extLst>
+              <a:ext uri="{FF2B5EF4-FFF2-40B4-BE49-F238E27FC236}">
+                <a16:creationId xmlns:a16="http://schemas.microsoft.com/office/drawing/2014/main" id="{C6522D2C-2973-F245-B65A-CBF1A12D04EF}"/>
+              </a:ext>
+            </a:extLst>
+          </p:cNvPr>
+          <p:cNvSpPr txBox="1"/>
+          <p:nvPr/>
+        </p:nvSpPr>
+        <p:spPr>
+          <a:xfrm>
+            <a:off x="5723459" y="517619"/>
+            <a:ext cx="453970" cy="369332"/>
+          </a:xfrm>
+          <a:prstGeom prst="rect">
+            <a:avLst/>
+          </a:prstGeom>
+          <a:noFill/>
+        </p:spPr>
+        <p:txBody>
+          <a:bodyPr wrap="none" rtlCol="0">
+            <a:spAutoFit/>
+          </a:bodyPr>
+          <a:lstStyle/>
+          <a:p>
+            <a:r>
+              <a:rPr lang="en-GB" dirty="0"/>
+              <a:t>x 1</a:t>
+            </a:r>
+          </a:p>
+        </p:txBody>
+      </p:sp>
+      <p:sp>
+        <p:nvSpPr>
+          <p:cNvPr id="22" name="TextBox 21">
+            <a:extLst>
+              <a:ext uri="{FF2B5EF4-FFF2-40B4-BE49-F238E27FC236}">
+                <a16:creationId xmlns:a16="http://schemas.microsoft.com/office/drawing/2014/main" id="{18C11F81-37B5-CB40-948F-25A07D42662B}"/>
+              </a:ext>
+            </a:extLst>
+          </p:cNvPr>
+          <p:cNvSpPr txBox="1"/>
+          <p:nvPr/>
+        </p:nvSpPr>
+        <p:spPr>
+          <a:xfrm>
+            <a:off x="5723459" y="2509970"/>
+            <a:ext cx="1530868" cy="646331"/>
+          </a:xfrm>
+          <a:prstGeom prst="rect">
+            <a:avLst/>
+          </a:prstGeom>
+          <a:noFill/>
+        </p:spPr>
+        <p:txBody>
+          <a:bodyPr wrap="none" rtlCol="0">
+            <a:spAutoFit/>
+          </a:bodyPr>
+          <a:lstStyle/>
+          <a:p>
+            <a:r>
+              <a:rPr lang="en-GB" dirty="0"/>
+              <a:t>x 7 chunks</a:t>
+            </a:r>
+          </a:p>
+          <a:p>
+            <a:r>
+              <a:rPr lang="en-GB" dirty="0"/>
+              <a:t>par réalisation</a:t>
+            </a:r>
+          </a:p>
+        </p:txBody>
+      </p:sp>
+      <p:sp>
+        <p:nvSpPr>
+          <p:cNvPr id="23" name="Right Brace 22">
+            <a:extLst>
+              <a:ext uri="{FF2B5EF4-FFF2-40B4-BE49-F238E27FC236}">
+                <a16:creationId xmlns:a16="http://schemas.microsoft.com/office/drawing/2014/main" id="{F6C59296-D839-194C-AF7E-294D97ECE615}"/>
+              </a:ext>
+            </a:extLst>
+          </p:cNvPr>
+          <p:cNvSpPr/>
+          <p:nvPr/>
+        </p:nvSpPr>
+        <p:spPr>
+          <a:xfrm>
+            <a:off x="5455831" y="4416552"/>
+            <a:ext cx="267628" cy="2266486"/>
+          </a:xfrm>
+          <a:prstGeom prst="rightBrace">
+            <a:avLst/>
+          </a:prstGeom>
+          <a:ln w="19050">
+            <a:solidFill>
+              <a:schemeClr val="tx1"/>
+            </a:solidFill>
+          </a:ln>
+        </p:spPr>
+        <p:style>
+          <a:lnRef idx="1">
+            <a:schemeClr val="accent1"/>
+          </a:lnRef>
+          <a:fillRef idx="0">
+            <a:schemeClr val="accent1"/>
+          </a:fillRef>
+          <a:effectRef idx="0">
+            <a:schemeClr val="accent1"/>
+          </a:effectRef>
+          <a:fontRef idx="minor">
+            <a:schemeClr val="tx1"/>
+          </a:fontRef>
+        </p:style>
+        <p:txBody>
+          <a:bodyPr rtlCol="0" anchor="ctr"/>
+          <a:lstStyle/>
+          <a:p>
+            <a:pPr algn="ctr"/>
+            <a:endParaRPr lang="en-GB"/>
+          </a:p>
+        </p:txBody>
+      </p:sp>
+      <p:sp>
+        <p:nvSpPr>
+          <p:cNvPr id="24" name="TextBox 23">
+            <a:extLst>
+              <a:ext uri="{FF2B5EF4-FFF2-40B4-BE49-F238E27FC236}">
+                <a16:creationId xmlns:a16="http://schemas.microsoft.com/office/drawing/2014/main" id="{96A9DFD4-7EA6-B148-BD7F-56AB8FCAB4F6}"/>
+              </a:ext>
+            </a:extLst>
+          </p:cNvPr>
+          <p:cNvSpPr txBox="1"/>
+          <p:nvPr/>
+        </p:nvSpPr>
+        <p:spPr>
+          <a:xfrm>
+            <a:off x="5723459" y="5226629"/>
+            <a:ext cx="1530868" cy="646331"/>
+          </a:xfrm>
+          <a:prstGeom prst="rect">
+            <a:avLst/>
+          </a:prstGeom>
+          <a:noFill/>
+        </p:spPr>
+        <p:txBody>
+          <a:bodyPr wrap="none" rtlCol="0">
+            <a:spAutoFit/>
+          </a:bodyPr>
+          <a:lstStyle/>
+          <a:p>
+            <a:r>
+              <a:rPr lang="en-GB" dirty="0"/>
+              <a:t>x 1</a:t>
+            </a:r>
+          </a:p>
+          <a:p>
+            <a:r>
+              <a:rPr lang="en-GB" dirty="0"/>
+              <a:t>par réalisation</a:t>
+            </a:r>
+          </a:p>
+        </p:txBody>
+      </p:sp>
+      <p:sp>
+        <p:nvSpPr>
+          <p:cNvPr id="26" name="Right Brace 25">
+            <a:extLst>
+              <a:ext uri="{FF2B5EF4-FFF2-40B4-BE49-F238E27FC236}">
+                <a16:creationId xmlns:a16="http://schemas.microsoft.com/office/drawing/2014/main" id="{52A3F082-FD78-284D-9352-1660C53EAF6A}"/>
+              </a:ext>
+            </a:extLst>
+          </p:cNvPr>
+          <p:cNvSpPr/>
+          <p:nvPr/>
+        </p:nvSpPr>
+        <p:spPr>
+          <a:xfrm flipH="1">
+            <a:off x="1788477" y="1695987"/>
+            <a:ext cx="267628" cy="1666581"/>
+          </a:xfrm>
+          <a:prstGeom prst="rightBrace">
+            <a:avLst>
+              <a:gd name="adj1" fmla="val 8333"/>
+              <a:gd name="adj2" fmla="val 50669"/>
+            </a:avLst>
+          </a:prstGeom>
+          <a:ln w="19050">
+            <a:solidFill>
+              <a:srgbClr val="00B050"/>
+            </a:solidFill>
+          </a:ln>
+        </p:spPr>
+        <p:style>
+          <a:lnRef idx="1">
+            <a:schemeClr val="accent1"/>
+          </a:lnRef>
+          <a:fillRef idx="0">
+            <a:schemeClr val="accent1"/>
+          </a:fillRef>
+          <a:effectRef idx="0">
+            <a:schemeClr val="accent1"/>
+          </a:effectRef>
+          <a:fontRef idx="minor">
+            <a:schemeClr val="tx1"/>
+          </a:fontRef>
+        </p:style>
+        <p:txBody>
+          <a:bodyPr rtlCol="0" anchor="ctr"/>
+          <a:lstStyle/>
+          <a:p>
+            <a:pPr algn="ctr"/>
+            <a:endParaRPr lang="en-GB"/>
+          </a:p>
+        </p:txBody>
+      </p:sp>
+      <p:sp>
+        <p:nvSpPr>
+          <p:cNvPr id="27" name="TextBox 26">
+            <a:extLst>
+              <a:ext uri="{FF2B5EF4-FFF2-40B4-BE49-F238E27FC236}">
+                <a16:creationId xmlns:a16="http://schemas.microsoft.com/office/drawing/2014/main" id="{6C939734-EC60-DF42-AC70-3FF82F1E7036}"/>
+              </a:ext>
+            </a:extLst>
+          </p:cNvPr>
+          <p:cNvSpPr txBox="1"/>
+          <p:nvPr/>
+        </p:nvSpPr>
+        <p:spPr>
+          <a:xfrm>
+            <a:off x="187078" y="2344164"/>
+            <a:ext cx="1601400" cy="369332"/>
+          </a:xfrm>
+          <a:prstGeom prst="rect">
+            <a:avLst/>
+          </a:prstGeom>
+          <a:noFill/>
+        </p:spPr>
+        <p:txBody>
+          <a:bodyPr wrap="none" rtlCol="0">
+            <a:spAutoFit/>
+          </a:bodyPr>
+          <a:lstStyle/>
+          <a:p>
+            <a:pPr algn="ctr"/>
+            <a:r>
+              <a:rPr lang="en-GB" dirty="0" err="1">
+                <a:solidFill>
+                  <a:srgbClr val="00B050"/>
+                </a:solidFill>
+              </a:rPr>
+              <a:t>Pré</a:t>
+            </a:r>
+            <a:r>
+              <a:rPr lang="en-GB" dirty="0">
+                <a:solidFill>
+                  <a:srgbClr val="00B050"/>
+                </a:solidFill>
+              </a:rPr>
+              <a:t>-production</a:t>
+            </a:r>
+          </a:p>
+        </p:txBody>
+      </p:sp>
+      <p:sp>
+        <p:nvSpPr>
+          <p:cNvPr id="28" name="Right Brace 27">
+            <a:extLst>
+              <a:ext uri="{FF2B5EF4-FFF2-40B4-BE49-F238E27FC236}">
+                <a16:creationId xmlns:a16="http://schemas.microsoft.com/office/drawing/2014/main" id="{00020D2D-7896-0A42-B068-412ACCAB7586}"/>
+              </a:ext>
+            </a:extLst>
+          </p:cNvPr>
+          <p:cNvSpPr/>
+          <p:nvPr/>
+        </p:nvSpPr>
+        <p:spPr>
+          <a:xfrm flipH="1">
+            <a:off x="1788477" y="3494807"/>
+            <a:ext cx="267622" cy="3188231"/>
+          </a:xfrm>
+          <a:prstGeom prst="rightBrace">
+            <a:avLst>
+              <a:gd name="adj1" fmla="val 8333"/>
+              <a:gd name="adj2" fmla="val 50669"/>
+            </a:avLst>
+          </a:prstGeom>
+          <a:ln w="19050">
+            <a:solidFill>
+              <a:schemeClr val="accent2">
+                <a:lumMod val="75000"/>
+              </a:schemeClr>
+            </a:solidFill>
+          </a:ln>
+        </p:spPr>
+        <p:style>
+          <a:lnRef idx="1">
+            <a:schemeClr val="accent1"/>
+          </a:lnRef>
+          <a:fillRef idx="0">
+            <a:schemeClr val="accent1"/>
+          </a:fillRef>
+          <a:effectRef idx="0">
+            <a:schemeClr val="accent1"/>
+          </a:effectRef>
+          <a:fontRef idx="minor">
+            <a:schemeClr val="tx1"/>
+          </a:fontRef>
+        </p:style>
+        <p:txBody>
+          <a:bodyPr rtlCol="0" anchor="ctr"/>
+          <a:lstStyle/>
+          <a:p>
+            <a:pPr algn="ctr"/>
+            <a:endParaRPr lang="en-GB"/>
+          </a:p>
+        </p:txBody>
+      </p:sp>
+      <p:sp>
+        <p:nvSpPr>
+          <p:cNvPr id="29" name="TextBox 28">
+            <a:extLst>
+              <a:ext uri="{FF2B5EF4-FFF2-40B4-BE49-F238E27FC236}">
+                <a16:creationId xmlns:a16="http://schemas.microsoft.com/office/drawing/2014/main" id="{1122DF6F-3C78-D74E-BA40-BB6F657DA7AD}"/>
+              </a:ext>
+            </a:extLst>
+          </p:cNvPr>
+          <p:cNvSpPr txBox="1"/>
+          <p:nvPr/>
+        </p:nvSpPr>
+        <p:spPr>
+          <a:xfrm>
+            <a:off x="105388" y="4904256"/>
+            <a:ext cx="1683089" cy="369332"/>
+          </a:xfrm>
+          <a:prstGeom prst="rect">
+            <a:avLst/>
+          </a:prstGeom>
+          <a:noFill/>
+        </p:spPr>
+        <p:txBody>
+          <a:bodyPr wrap="none" rtlCol="0">
+            <a:spAutoFit/>
+          </a:bodyPr>
+          <a:lstStyle/>
+          <a:p>
+            <a:pPr algn="ctr"/>
+            <a:r>
+              <a:rPr lang="en-GB" dirty="0">
+                <a:solidFill>
+                  <a:schemeClr val="accent2">
+                    <a:lumMod val="75000"/>
+                  </a:schemeClr>
+                </a:solidFill>
+              </a:rPr>
+              <a:t>Post-production</a:t>
+            </a:r>
+          </a:p>
+        </p:txBody>
+      </p:sp>
+      <p:cxnSp>
+        <p:nvCxnSpPr>
+          <p:cNvPr id="44" name="Straight Arrow Connector 43">
+            <a:extLst>
+              <a:ext uri="{FF2B5EF4-FFF2-40B4-BE49-F238E27FC236}">
+                <a16:creationId xmlns:a16="http://schemas.microsoft.com/office/drawing/2014/main" id="{E024DF3B-2784-CA45-92A4-ADAD8D6D1D63}"/>
+              </a:ext>
+            </a:extLst>
+          </p:cNvPr>
+          <p:cNvCxnSpPr>
+            <a:cxnSpLocks/>
+          </p:cNvCxnSpPr>
+          <p:nvPr/>
+        </p:nvCxnSpPr>
+        <p:spPr>
+          <a:xfrm flipH="1">
+            <a:off x="3419986" y="1283758"/>
+            <a:ext cx="3" cy="242657"/>
+          </a:xfrm>
+          <a:prstGeom prst="straightConnector1">
+            <a:avLst/>
+          </a:prstGeom>
+          <a:ln w="19050">
+            <a:solidFill>
+              <a:schemeClr val="tx1"/>
+            </a:solidFill>
+            <a:tailEnd type="triangle"/>
+          </a:ln>
+        </p:spPr>
+        <p:style>
+          <a:lnRef idx="1">
+            <a:schemeClr val="accent1"/>
+          </a:lnRef>
+          <a:fillRef idx="0">
+            <a:schemeClr val="accent1"/>
+          </a:fillRef>
+          <a:effectRef idx="0">
+            <a:schemeClr val="accent1"/>
+          </a:effectRef>
+          <a:fontRef idx="minor">
+            <a:schemeClr val="tx1"/>
+          </a:fontRef>
+        </p:style>
+      </p:cxnSp>
+      <p:cxnSp>
+        <p:nvCxnSpPr>
+          <p:cNvPr id="46" name="Straight Arrow Connector 45">
+            <a:extLst>
+              <a:ext uri="{FF2B5EF4-FFF2-40B4-BE49-F238E27FC236}">
+                <a16:creationId xmlns:a16="http://schemas.microsoft.com/office/drawing/2014/main" id="{676E96CA-4CD9-334E-BF75-AF0F4B544614}"/>
+              </a:ext>
+            </a:extLst>
+          </p:cNvPr>
+          <p:cNvCxnSpPr>
+            <a:cxnSpLocks/>
+          </p:cNvCxnSpPr>
+          <p:nvPr/>
+        </p:nvCxnSpPr>
+        <p:spPr>
+          <a:xfrm flipH="1">
+            <a:off x="3419980" y="4004323"/>
+            <a:ext cx="3" cy="242657"/>
+          </a:xfrm>
+          <a:prstGeom prst="straightConnector1">
+            <a:avLst/>
+          </a:prstGeom>
+          <a:ln w="19050">
+            <a:solidFill>
+              <a:schemeClr val="tx1"/>
+            </a:solidFill>
+            <a:tailEnd type="triangle"/>
+          </a:ln>
+        </p:spPr>
+        <p:style>
+          <a:lnRef idx="1">
+            <a:schemeClr val="accent1"/>
+          </a:lnRef>
+          <a:fillRef idx="0">
+            <a:schemeClr val="accent1"/>
+          </a:fillRef>
+          <a:effectRef idx="0">
+            <a:schemeClr val="accent1"/>
+          </a:effectRef>
+          <a:fontRef idx="minor">
+            <a:schemeClr val="tx1"/>
+          </a:fontRef>
+        </p:style>
+      </p:cxnSp>
+      <p:sp>
+        <p:nvSpPr>
+          <p:cNvPr id="49" name="TextBox 48">
+            <a:extLst>
+              <a:ext uri="{FF2B5EF4-FFF2-40B4-BE49-F238E27FC236}">
+                <a16:creationId xmlns:a16="http://schemas.microsoft.com/office/drawing/2014/main" id="{680A5A51-CE0C-FC4E-9E97-0C1FFDDF2E31}"/>
+              </a:ext>
+            </a:extLst>
+          </p:cNvPr>
+          <p:cNvSpPr txBox="1"/>
+          <p:nvPr/>
+        </p:nvSpPr>
+        <p:spPr>
+          <a:xfrm>
+            <a:off x="4730112" y="277611"/>
+            <a:ext cx="615874" cy="276999"/>
+          </a:xfrm>
+          <a:prstGeom prst="rect">
+            <a:avLst/>
+          </a:prstGeom>
+          <a:noFill/>
+        </p:spPr>
+        <p:txBody>
+          <a:bodyPr wrap="none" rtlCol="0">
+            <a:spAutoFit/>
+          </a:bodyPr>
+          <a:lstStyle/>
+          <a:p>
+            <a:r>
+              <a:rPr lang="en-GB" sz="1200" dirty="0"/>
+              <a:t>20 min</a:t>
+            </a:r>
+          </a:p>
+        </p:txBody>
+      </p:sp>
+      <p:cxnSp>
+        <p:nvCxnSpPr>
+          <p:cNvPr id="56" name="Straight Connector 55">
+            <a:extLst>
+              <a:ext uri="{FF2B5EF4-FFF2-40B4-BE49-F238E27FC236}">
+                <a16:creationId xmlns:a16="http://schemas.microsoft.com/office/drawing/2014/main" id="{BA6CE8EE-E46C-8E48-B369-35D06175597F}"/>
+              </a:ext>
+            </a:extLst>
+          </p:cNvPr>
+          <p:cNvCxnSpPr>
+            <a:cxnSpLocks/>
+          </p:cNvCxnSpPr>
+          <p:nvPr/>
+        </p:nvCxnSpPr>
+        <p:spPr>
+          <a:xfrm>
+            <a:off x="4524327" y="416111"/>
+            <a:ext cx="209176" cy="0"/>
+          </a:xfrm>
+          <a:prstGeom prst="line">
+            <a:avLst/>
+          </a:prstGeom>
+          <a:ln w="12700">
+            <a:solidFill>
+              <a:schemeClr val="tx1"/>
+            </a:solidFill>
+          </a:ln>
+        </p:spPr>
+        <p:style>
+          <a:lnRef idx="1">
+            <a:schemeClr val="accent1"/>
+          </a:lnRef>
+          <a:fillRef idx="0">
+            <a:schemeClr val="accent1"/>
+          </a:fillRef>
+          <a:effectRef idx="0">
+            <a:schemeClr val="accent1"/>
+          </a:effectRef>
+          <a:fontRef idx="minor">
+            <a:schemeClr val="tx1"/>
+          </a:fontRef>
+        </p:style>
+      </p:cxnSp>
+      <p:sp>
+        <p:nvSpPr>
+          <p:cNvPr id="61" name="TextBox 60">
+            <a:extLst>
+              <a:ext uri="{FF2B5EF4-FFF2-40B4-BE49-F238E27FC236}">
+                <a16:creationId xmlns:a16="http://schemas.microsoft.com/office/drawing/2014/main" id="{4E0259A9-F424-6A43-AF85-76FB347CCF37}"/>
+              </a:ext>
+            </a:extLst>
+          </p:cNvPr>
+          <p:cNvSpPr txBox="1"/>
+          <p:nvPr/>
+        </p:nvSpPr>
+        <p:spPr>
+          <a:xfrm>
+            <a:off x="4730112" y="868602"/>
+            <a:ext cx="537327" cy="276999"/>
+          </a:xfrm>
+          <a:prstGeom prst="rect">
+            <a:avLst/>
+          </a:prstGeom>
+          <a:noFill/>
+        </p:spPr>
+        <p:txBody>
+          <a:bodyPr wrap="none" rtlCol="0">
+            <a:spAutoFit/>
+          </a:bodyPr>
+          <a:lstStyle/>
+          <a:p>
+            <a:r>
+              <a:rPr lang="en-GB" sz="1200" dirty="0"/>
+              <a:t>5 min</a:t>
+            </a:r>
+          </a:p>
+        </p:txBody>
+      </p:sp>
+      <p:cxnSp>
+        <p:nvCxnSpPr>
+          <p:cNvPr id="62" name="Straight Connector 61">
+            <a:extLst>
+              <a:ext uri="{FF2B5EF4-FFF2-40B4-BE49-F238E27FC236}">
+                <a16:creationId xmlns:a16="http://schemas.microsoft.com/office/drawing/2014/main" id="{9AE0D421-B812-DF4E-B4F1-F764240EFBCA}"/>
+              </a:ext>
+            </a:extLst>
+          </p:cNvPr>
+          <p:cNvCxnSpPr>
+            <a:cxnSpLocks/>
+          </p:cNvCxnSpPr>
+          <p:nvPr/>
+        </p:nvCxnSpPr>
+        <p:spPr>
+          <a:xfrm>
+            <a:off x="4524327" y="1007102"/>
+            <a:ext cx="209176" cy="0"/>
+          </a:xfrm>
+          <a:prstGeom prst="line">
+            <a:avLst/>
+          </a:prstGeom>
+          <a:ln w="12700">
+            <a:solidFill>
+              <a:schemeClr val="tx1"/>
+            </a:solidFill>
+          </a:ln>
+        </p:spPr>
+        <p:style>
+          <a:lnRef idx="1">
+            <a:schemeClr val="accent1"/>
+          </a:lnRef>
+          <a:fillRef idx="0">
+            <a:schemeClr val="accent1"/>
+          </a:fillRef>
+          <a:effectRef idx="0">
+            <a:schemeClr val="accent1"/>
+          </a:effectRef>
+          <a:fontRef idx="minor">
+            <a:schemeClr val="tx1"/>
+          </a:fontRef>
+        </p:style>
+      </p:cxnSp>
+      <p:sp>
+        <p:nvSpPr>
+          <p:cNvPr id="63" name="TextBox 62">
+            <a:extLst>
+              <a:ext uri="{FF2B5EF4-FFF2-40B4-BE49-F238E27FC236}">
+                <a16:creationId xmlns:a16="http://schemas.microsoft.com/office/drawing/2014/main" id="{5F224F3D-EDBB-204A-9197-86D7646228F2}"/>
+              </a:ext>
+            </a:extLst>
+          </p:cNvPr>
+          <p:cNvSpPr txBox="1"/>
+          <p:nvPr/>
+        </p:nvSpPr>
+        <p:spPr>
+          <a:xfrm>
+            <a:off x="4730112" y="1801781"/>
+            <a:ext cx="694421" cy="276999"/>
+          </a:xfrm>
+          <a:prstGeom prst="rect">
+            <a:avLst/>
+          </a:prstGeom>
+          <a:noFill/>
+        </p:spPr>
+        <p:txBody>
+          <a:bodyPr wrap="none" rtlCol="0">
+            <a:spAutoFit/>
+          </a:bodyPr>
+          <a:lstStyle/>
+          <a:p>
+            <a:r>
+              <a:rPr lang="en-GB" sz="1200" dirty="0"/>
+              <a:t>210 min</a:t>
+            </a:r>
+          </a:p>
+        </p:txBody>
+      </p:sp>
+      <p:cxnSp>
+        <p:nvCxnSpPr>
+          <p:cNvPr id="64" name="Straight Connector 63">
+            <a:extLst>
+              <a:ext uri="{FF2B5EF4-FFF2-40B4-BE49-F238E27FC236}">
+                <a16:creationId xmlns:a16="http://schemas.microsoft.com/office/drawing/2014/main" id="{291C96D7-6926-3C44-ADE4-3AB02CCB1EDE}"/>
+              </a:ext>
+            </a:extLst>
+          </p:cNvPr>
+          <p:cNvCxnSpPr>
+            <a:cxnSpLocks/>
+          </p:cNvCxnSpPr>
+          <p:nvPr/>
+        </p:nvCxnSpPr>
+        <p:spPr>
+          <a:xfrm>
+            <a:off x="4524327" y="1940281"/>
+            <a:ext cx="209176" cy="0"/>
+          </a:xfrm>
+          <a:prstGeom prst="line">
+            <a:avLst/>
+          </a:prstGeom>
+          <a:ln w="12700">
+            <a:solidFill>
+              <a:schemeClr val="tx1"/>
+            </a:solidFill>
+          </a:ln>
+        </p:spPr>
+        <p:style>
+          <a:lnRef idx="1">
+            <a:schemeClr val="accent1"/>
+          </a:lnRef>
+          <a:fillRef idx="0">
+            <a:schemeClr val="accent1"/>
+          </a:fillRef>
+          <a:effectRef idx="0">
+            <a:schemeClr val="accent1"/>
+          </a:effectRef>
+          <a:fontRef idx="minor">
+            <a:schemeClr val="tx1"/>
+          </a:fontRef>
+        </p:style>
+      </p:cxnSp>
+      <p:sp>
+        <p:nvSpPr>
+          <p:cNvPr id="65" name="TextBox 64">
+            <a:extLst>
+              <a:ext uri="{FF2B5EF4-FFF2-40B4-BE49-F238E27FC236}">
+                <a16:creationId xmlns:a16="http://schemas.microsoft.com/office/drawing/2014/main" id="{BA5B026A-2868-F545-9001-59005ED27E69}"/>
+              </a:ext>
+            </a:extLst>
+          </p:cNvPr>
+          <p:cNvSpPr txBox="1"/>
+          <p:nvPr/>
+        </p:nvSpPr>
+        <p:spPr>
+          <a:xfrm>
+            <a:off x="4726721" y="2401800"/>
+            <a:ext cx="537327" cy="276999"/>
+          </a:xfrm>
+          <a:prstGeom prst="rect">
+            <a:avLst/>
+          </a:prstGeom>
+          <a:noFill/>
+        </p:spPr>
+        <p:txBody>
+          <a:bodyPr wrap="none" rtlCol="0">
+            <a:spAutoFit/>
+          </a:bodyPr>
+          <a:lstStyle/>
+          <a:p>
+            <a:r>
+              <a:rPr lang="en-GB" sz="1200" dirty="0"/>
+              <a:t>2 min</a:t>
+            </a:r>
+          </a:p>
+        </p:txBody>
+      </p:sp>
+      <p:cxnSp>
+        <p:nvCxnSpPr>
+          <p:cNvPr id="66" name="Straight Connector 65">
+            <a:extLst>
+              <a:ext uri="{FF2B5EF4-FFF2-40B4-BE49-F238E27FC236}">
+                <a16:creationId xmlns:a16="http://schemas.microsoft.com/office/drawing/2014/main" id="{D86F045A-D52A-714B-A614-91EDD6604295}"/>
+              </a:ext>
+            </a:extLst>
+          </p:cNvPr>
+          <p:cNvCxnSpPr>
+            <a:cxnSpLocks/>
+          </p:cNvCxnSpPr>
+          <p:nvPr/>
+        </p:nvCxnSpPr>
+        <p:spPr>
+          <a:xfrm>
+            <a:off x="4520936" y="2540300"/>
+            <a:ext cx="209176" cy="0"/>
+          </a:xfrm>
+          <a:prstGeom prst="line">
+            <a:avLst/>
+          </a:prstGeom>
+          <a:ln w="12700">
+            <a:solidFill>
+              <a:schemeClr val="tx1"/>
+            </a:solidFill>
+          </a:ln>
+        </p:spPr>
+        <p:style>
+          <a:lnRef idx="1">
+            <a:schemeClr val="accent1"/>
+          </a:lnRef>
+          <a:fillRef idx="0">
+            <a:schemeClr val="accent1"/>
+          </a:fillRef>
+          <a:effectRef idx="0">
+            <a:schemeClr val="accent1"/>
+          </a:effectRef>
+          <a:fontRef idx="minor">
+            <a:schemeClr val="tx1"/>
+          </a:fontRef>
+        </p:style>
+      </p:cxnSp>
+      <p:sp>
+        <p:nvSpPr>
+          <p:cNvPr id="67" name="TextBox 66">
+            <a:extLst>
+              <a:ext uri="{FF2B5EF4-FFF2-40B4-BE49-F238E27FC236}">
+                <a16:creationId xmlns:a16="http://schemas.microsoft.com/office/drawing/2014/main" id="{6548874A-8AF9-F149-89E2-A58E060D5C55}"/>
+              </a:ext>
+            </a:extLst>
+          </p:cNvPr>
+          <p:cNvSpPr txBox="1"/>
+          <p:nvPr/>
+        </p:nvSpPr>
+        <p:spPr>
+          <a:xfrm>
+            <a:off x="4726721" y="3006256"/>
+            <a:ext cx="537327" cy="276999"/>
+          </a:xfrm>
+          <a:prstGeom prst="rect">
+            <a:avLst/>
+          </a:prstGeom>
+          <a:noFill/>
+        </p:spPr>
+        <p:txBody>
+          <a:bodyPr wrap="none" rtlCol="0">
+            <a:spAutoFit/>
+          </a:bodyPr>
+          <a:lstStyle/>
+          <a:p>
+            <a:r>
+              <a:rPr lang="en-GB" sz="1200" dirty="0"/>
+              <a:t>6 min</a:t>
+            </a:r>
+          </a:p>
+        </p:txBody>
+      </p:sp>
+      <p:cxnSp>
+        <p:nvCxnSpPr>
+          <p:cNvPr id="68" name="Straight Connector 67">
+            <a:extLst>
+              <a:ext uri="{FF2B5EF4-FFF2-40B4-BE49-F238E27FC236}">
+                <a16:creationId xmlns:a16="http://schemas.microsoft.com/office/drawing/2014/main" id="{9D08D65C-1202-0C4D-ADE4-99AEFC56BEB7}"/>
+              </a:ext>
+            </a:extLst>
+          </p:cNvPr>
+          <p:cNvCxnSpPr>
+            <a:cxnSpLocks/>
+          </p:cNvCxnSpPr>
+          <p:nvPr/>
+        </p:nvCxnSpPr>
+        <p:spPr>
+          <a:xfrm>
+            <a:off x="4520936" y="3144756"/>
+            <a:ext cx="209176" cy="0"/>
+          </a:xfrm>
+          <a:prstGeom prst="line">
+            <a:avLst/>
+          </a:prstGeom>
+          <a:ln w="12700">
+            <a:solidFill>
+              <a:schemeClr val="tx1"/>
+            </a:solidFill>
+          </a:ln>
+        </p:spPr>
+        <p:style>
+          <a:lnRef idx="1">
+            <a:schemeClr val="accent1"/>
+          </a:lnRef>
+          <a:fillRef idx="0">
+            <a:schemeClr val="accent1"/>
+          </a:fillRef>
+          <a:effectRef idx="0">
+            <a:schemeClr val="accent1"/>
+          </a:effectRef>
+          <a:fontRef idx="minor">
+            <a:schemeClr val="tx1"/>
+          </a:fontRef>
+        </p:style>
+      </p:cxnSp>
+      <p:sp>
+        <p:nvSpPr>
+          <p:cNvPr id="69" name="TextBox 68">
+            <a:extLst>
+              <a:ext uri="{FF2B5EF4-FFF2-40B4-BE49-F238E27FC236}">
+                <a16:creationId xmlns:a16="http://schemas.microsoft.com/office/drawing/2014/main" id="{96AB83C4-F57F-A14C-99B5-82573EEEB716}"/>
+              </a:ext>
+            </a:extLst>
+          </p:cNvPr>
+          <p:cNvSpPr txBox="1"/>
+          <p:nvPr/>
+        </p:nvSpPr>
+        <p:spPr>
+          <a:xfrm>
+            <a:off x="4722568" y="3610711"/>
+            <a:ext cx="537327" cy="276999"/>
+          </a:xfrm>
+          <a:prstGeom prst="rect">
+            <a:avLst/>
+          </a:prstGeom>
+          <a:noFill/>
+        </p:spPr>
+        <p:txBody>
+          <a:bodyPr wrap="none" rtlCol="0">
+            <a:spAutoFit/>
+          </a:bodyPr>
+          <a:lstStyle/>
+          <a:p>
+            <a:r>
+              <a:rPr lang="en-GB" sz="1200" dirty="0"/>
+              <a:t>3 min</a:t>
+            </a:r>
+          </a:p>
+        </p:txBody>
+      </p:sp>
+      <p:cxnSp>
+        <p:nvCxnSpPr>
+          <p:cNvPr id="70" name="Straight Connector 69">
+            <a:extLst>
+              <a:ext uri="{FF2B5EF4-FFF2-40B4-BE49-F238E27FC236}">
+                <a16:creationId xmlns:a16="http://schemas.microsoft.com/office/drawing/2014/main" id="{4681E2BB-121A-984F-917D-2FE67322D151}"/>
+              </a:ext>
+            </a:extLst>
+          </p:cNvPr>
+          <p:cNvCxnSpPr>
+            <a:cxnSpLocks/>
+          </p:cNvCxnSpPr>
+          <p:nvPr/>
+        </p:nvCxnSpPr>
+        <p:spPr>
+          <a:xfrm>
+            <a:off x="4516783" y="3749211"/>
+            <a:ext cx="209176" cy="0"/>
+          </a:xfrm>
+          <a:prstGeom prst="line">
+            <a:avLst/>
+          </a:prstGeom>
+          <a:ln w="12700">
+            <a:solidFill>
+              <a:schemeClr val="tx1"/>
+            </a:solidFill>
+          </a:ln>
+        </p:spPr>
+        <p:style>
+          <a:lnRef idx="1">
+            <a:schemeClr val="accent1"/>
+          </a:lnRef>
+          <a:fillRef idx="0">
+            <a:schemeClr val="accent1"/>
+          </a:fillRef>
+          <a:effectRef idx="0">
+            <a:schemeClr val="accent1"/>
+          </a:effectRef>
+          <a:fontRef idx="minor">
+            <a:schemeClr val="tx1"/>
+          </a:fontRef>
+        </p:style>
+      </p:cxnSp>
+      <p:sp>
+        <p:nvSpPr>
+          <p:cNvPr id="71" name="TextBox 70">
+            <a:extLst>
+              <a:ext uri="{FF2B5EF4-FFF2-40B4-BE49-F238E27FC236}">
+                <a16:creationId xmlns:a16="http://schemas.microsoft.com/office/drawing/2014/main" id="{788D8B23-88C7-4148-AC56-BEBB47C93EC4}"/>
+              </a:ext>
+            </a:extLst>
+          </p:cNvPr>
+          <p:cNvSpPr txBox="1"/>
+          <p:nvPr/>
+        </p:nvSpPr>
+        <p:spPr>
+          <a:xfrm>
+            <a:off x="4722568" y="4525989"/>
+            <a:ext cx="537327" cy="276999"/>
+          </a:xfrm>
+          <a:prstGeom prst="rect">
+            <a:avLst/>
+          </a:prstGeom>
+          <a:noFill/>
+        </p:spPr>
+        <p:txBody>
+          <a:bodyPr wrap="none" rtlCol="0">
+            <a:spAutoFit/>
+          </a:bodyPr>
+          <a:lstStyle/>
+          <a:p>
+            <a:r>
+              <a:rPr lang="en-GB" sz="1200" dirty="0"/>
+              <a:t>5 min</a:t>
+            </a:r>
+          </a:p>
+        </p:txBody>
+      </p:sp>
+      <p:cxnSp>
+        <p:nvCxnSpPr>
+          <p:cNvPr id="72" name="Straight Connector 71">
+            <a:extLst>
+              <a:ext uri="{FF2B5EF4-FFF2-40B4-BE49-F238E27FC236}">
+                <a16:creationId xmlns:a16="http://schemas.microsoft.com/office/drawing/2014/main" id="{A9C9285F-47C8-1946-B329-B3259F192F8C}"/>
+              </a:ext>
+            </a:extLst>
+          </p:cNvPr>
+          <p:cNvCxnSpPr>
+            <a:cxnSpLocks/>
+          </p:cNvCxnSpPr>
+          <p:nvPr/>
+        </p:nvCxnSpPr>
+        <p:spPr>
+          <a:xfrm>
+            <a:off x="4516783" y="4664489"/>
+            <a:ext cx="209176" cy="0"/>
+          </a:xfrm>
+          <a:prstGeom prst="line">
+            <a:avLst/>
+          </a:prstGeom>
+          <a:ln w="12700">
+            <a:solidFill>
+              <a:schemeClr val="tx1"/>
+            </a:solidFill>
+          </a:ln>
+        </p:spPr>
+        <p:style>
+          <a:lnRef idx="1">
+            <a:schemeClr val="accent1"/>
+          </a:lnRef>
+          <a:fillRef idx="0">
+            <a:schemeClr val="accent1"/>
+          </a:fillRef>
+          <a:effectRef idx="0">
+            <a:schemeClr val="accent1"/>
+          </a:effectRef>
+          <a:fontRef idx="minor">
+            <a:schemeClr val="tx1"/>
+          </a:fontRef>
+        </p:style>
+      </p:cxnSp>
+      <p:sp>
+        <p:nvSpPr>
+          <p:cNvPr id="73" name="TextBox 72">
+            <a:extLst>
+              <a:ext uri="{FF2B5EF4-FFF2-40B4-BE49-F238E27FC236}">
+                <a16:creationId xmlns:a16="http://schemas.microsoft.com/office/drawing/2014/main" id="{7C6389EA-BBE9-9148-B674-B8066E90B1C3}"/>
+              </a:ext>
+            </a:extLst>
+          </p:cNvPr>
+          <p:cNvSpPr txBox="1"/>
+          <p:nvPr/>
+        </p:nvSpPr>
+        <p:spPr>
+          <a:xfrm>
+            <a:off x="4722568" y="5128298"/>
+            <a:ext cx="615874" cy="276999"/>
+          </a:xfrm>
+          <a:prstGeom prst="rect">
+            <a:avLst/>
+          </a:prstGeom>
+          <a:noFill/>
+        </p:spPr>
+        <p:txBody>
+          <a:bodyPr wrap="none" rtlCol="0">
+            <a:spAutoFit/>
+          </a:bodyPr>
+          <a:lstStyle/>
+          <a:p>
+            <a:r>
+              <a:rPr lang="en-GB" sz="1200" dirty="0"/>
+              <a:t>30 min</a:t>
+            </a:r>
+          </a:p>
+        </p:txBody>
+      </p:sp>
+      <p:cxnSp>
+        <p:nvCxnSpPr>
+          <p:cNvPr id="74" name="Straight Connector 73">
+            <a:extLst>
+              <a:ext uri="{FF2B5EF4-FFF2-40B4-BE49-F238E27FC236}">
+                <a16:creationId xmlns:a16="http://schemas.microsoft.com/office/drawing/2014/main" id="{CB0149A3-E1AB-1B47-B8CA-C354BC74F450}"/>
+              </a:ext>
+            </a:extLst>
+          </p:cNvPr>
+          <p:cNvCxnSpPr>
+            <a:cxnSpLocks/>
+          </p:cNvCxnSpPr>
+          <p:nvPr/>
+        </p:nvCxnSpPr>
+        <p:spPr>
+          <a:xfrm>
+            <a:off x="4516783" y="5266798"/>
+            <a:ext cx="209176" cy="0"/>
+          </a:xfrm>
+          <a:prstGeom prst="line">
+            <a:avLst/>
+          </a:prstGeom>
+          <a:ln w="12700">
+            <a:solidFill>
+              <a:schemeClr val="tx1"/>
+            </a:solidFill>
+          </a:ln>
+        </p:spPr>
+        <p:style>
+          <a:lnRef idx="1">
+            <a:schemeClr val="accent1"/>
+          </a:lnRef>
+          <a:fillRef idx="0">
+            <a:schemeClr val="accent1"/>
+          </a:fillRef>
+          <a:effectRef idx="0">
+            <a:schemeClr val="accent1"/>
+          </a:effectRef>
+          <a:fontRef idx="minor">
+            <a:schemeClr val="tx1"/>
+          </a:fontRef>
+        </p:style>
+      </p:cxnSp>
+      <p:sp>
+        <p:nvSpPr>
+          <p:cNvPr id="75" name="TextBox 74">
+            <a:extLst>
+              <a:ext uri="{FF2B5EF4-FFF2-40B4-BE49-F238E27FC236}">
+                <a16:creationId xmlns:a16="http://schemas.microsoft.com/office/drawing/2014/main" id="{BD79C5C8-A5DE-044E-82A7-650DE3CE0435}"/>
+              </a:ext>
+            </a:extLst>
+          </p:cNvPr>
+          <p:cNvSpPr txBox="1"/>
+          <p:nvPr/>
+        </p:nvSpPr>
+        <p:spPr>
+          <a:xfrm>
+            <a:off x="4730112" y="5730607"/>
+            <a:ext cx="537327" cy="276999"/>
+          </a:xfrm>
+          <a:prstGeom prst="rect">
+            <a:avLst/>
+          </a:prstGeom>
+          <a:noFill/>
+        </p:spPr>
+        <p:txBody>
+          <a:bodyPr wrap="none" rtlCol="0">
+            <a:spAutoFit/>
+          </a:bodyPr>
+          <a:lstStyle/>
+          <a:p>
+            <a:r>
+              <a:rPr lang="en-GB" sz="1200" dirty="0"/>
+              <a:t>1 min</a:t>
+            </a:r>
+          </a:p>
+        </p:txBody>
+      </p:sp>
+      <p:cxnSp>
+        <p:nvCxnSpPr>
+          <p:cNvPr id="76" name="Straight Connector 75">
+            <a:extLst>
+              <a:ext uri="{FF2B5EF4-FFF2-40B4-BE49-F238E27FC236}">
+                <a16:creationId xmlns:a16="http://schemas.microsoft.com/office/drawing/2014/main" id="{62260FDF-4A63-F745-A35B-716BE072A376}"/>
+              </a:ext>
+            </a:extLst>
+          </p:cNvPr>
+          <p:cNvCxnSpPr>
+            <a:cxnSpLocks/>
+          </p:cNvCxnSpPr>
+          <p:nvPr/>
+        </p:nvCxnSpPr>
+        <p:spPr>
+          <a:xfrm>
+            <a:off x="4524327" y="5869107"/>
+            <a:ext cx="209176" cy="0"/>
+          </a:xfrm>
+          <a:prstGeom prst="line">
+            <a:avLst/>
+          </a:prstGeom>
+          <a:ln w="12700">
+            <a:solidFill>
+              <a:schemeClr val="tx1"/>
+            </a:solidFill>
+          </a:ln>
+        </p:spPr>
+        <p:style>
+          <a:lnRef idx="1">
+            <a:schemeClr val="accent1"/>
+          </a:lnRef>
+          <a:fillRef idx="0">
+            <a:schemeClr val="accent1"/>
+          </a:fillRef>
+          <a:effectRef idx="0">
+            <a:schemeClr val="accent1"/>
+          </a:effectRef>
+          <a:fontRef idx="minor">
+            <a:schemeClr val="tx1"/>
+          </a:fontRef>
+        </p:style>
+      </p:cxnSp>
+      <p:sp>
+        <p:nvSpPr>
+          <p:cNvPr id="77" name="TextBox 76">
+            <a:extLst>
+              <a:ext uri="{FF2B5EF4-FFF2-40B4-BE49-F238E27FC236}">
+                <a16:creationId xmlns:a16="http://schemas.microsoft.com/office/drawing/2014/main" id="{B0F02524-BD96-144C-A0CF-C1415DC902D5}"/>
+              </a:ext>
+            </a:extLst>
+          </p:cNvPr>
+          <p:cNvSpPr txBox="1"/>
+          <p:nvPr/>
+        </p:nvSpPr>
+        <p:spPr>
+          <a:xfrm>
+            <a:off x="4730112" y="6324811"/>
+            <a:ext cx="537327" cy="276999"/>
+          </a:xfrm>
+          <a:prstGeom prst="rect">
+            <a:avLst/>
+          </a:prstGeom>
+          <a:noFill/>
+        </p:spPr>
+        <p:txBody>
+          <a:bodyPr wrap="none" rtlCol="0">
+            <a:spAutoFit/>
+          </a:bodyPr>
+          <a:lstStyle/>
+          <a:p>
+            <a:r>
+              <a:rPr lang="en-GB" sz="1200" dirty="0"/>
+              <a:t>5 min</a:t>
+            </a:r>
+          </a:p>
+        </p:txBody>
+      </p:sp>
+      <p:cxnSp>
+        <p:nvCxnSpPr>
+          <p:cNvPr id="78" name="Straight Connector 77">
+            <a:extLst>
+              <a:ext uri="{FF2B5EF4-FFF2-40B4-BE49-F238E27FC236}">
+                <a16:creationId xmlns:a16="http://schemas.microsoft.com/office/drawing/2014/main" id="{F895D69D-82A5-6A46-BB6B-E932DEFE8B31}"/>
+              </a:ext>
+            </a:extLst>
+          </p:cNvPr>
+          <p:cNvCxnSpPr>
+            <a:cxnSpLocks/>
+          </p:cNvCxnSpPr>
+          <p:nvPr/>
+        </p:nvCxnSpPr>
+        <p:spPr>
+          <a:xfrm>
+            <a:off x="4524327" y="6463311"/>
+            <a:ext cx="209176" cy="0"/>
+          </a:xfrm>
+          <a:prstGeom prst="line">
+            <a:avLst/>
+          </a:prstGeom>
+          <a:ln w="12700">
+            <a:solidFill>
+              <a:schemeClr val="tx1"/>
+            </a:solidFill>
+          </a:ln>
+        </p:spPr>
+        <p:style>
+          <a:lnRef idx="1">
+            <a:schemeClr val="accent1"/>
+          </a:lnRef>
+          <a:fillRef idx="0">
+            <a:schemeClr val="accent1"/>
+          </a:fillRef>
+          <a:effectRef idx="0">
+            <a:schemeClr val="accent1"/>
+          </a:effectRef>
+          <a:fontRef idx="minor">
+            <a:schemeClr val="tx1"/>
+          </a:fontRef>
+        </p:style>
+      </p:cxnSp>
+      <p:sp>
+        <p:nvSpPr>
+          <p:cNvPr id="79" name="Right Brace 78">
+            <a:extLst>
+              <a:ext uri="{FF2B5EF4-FFF2-40B4-BE49-F238E27FC236}">
+                <a16:creationId xmlns:a16="http://schemas.microsoft.com/office/drawing/2014/main" id="{0BC6AF83-6DF9-EE45-B41A-108A89A28ACE}"/>
+              </a:ext>
+            </a:extLst>
+          </p:cNvPr>
+          <p:cNvSpPr/>
+          <p:nvPr/>
+        </p:nvSpPr>
+        <p:spPr>
+          <a:xfrm flipH="1">
+            <a:off x="1783083" y="168946"/>
+            <a:ext cx="267628" cy="1066677"/>
+          </a:xfrm>
+          <a:prstGeom prst="rightBrace">
+            <a:avLst>
+              <a:gd name="adj1" fmla="val 8333"/>
+              <a:gd name="adj2" fmla="val 50669"/>
+            </a:avLst>
+          </a:prstGeom>
+          <a:ln w="19050">
+            <a:solidFill>
+              <a:srgbClr val="0070C0"/>
+            </a:solidFill>
+          </a:ln>
+        </p:spPr>
+        <p:style>
+          <a:lnRef idx="1">
+            <a:schemeClr val="accent1"/>
+          </a:lnRef>
+          <a:fillRef idx="0">
+            <a:schemeClr val="accent1"/>
+          </a:fillRef>
+          <a:effectRef idx="0">
+            <a:schemeClr val="accent1"/>
+          </a:effectRef>
+          <a:fontRef idx="minor">
+            <a:schemeClr val="tx1"/>
+          </a:fontRef>
+        </p:style>
+        <p:txBody>
+          <a:bodyPr rtlCol="0" anchor="ctr"/>
+          <a:lstStyle/>
+          <a:p>
+            <a:pPr algn="ctr"/>
+            <a:endParaRPr lang="en-GB">
+              <a:solidFill>
+                <a:srgbClr val="0070C0"/>
+              </a:solidFill>
+            </a:endParaRPr>
+          </a:p>
+        </p:txBody>
+      </p:sp>
+      <p:sp>
+        <p:nvSpPr>
+          <p:cNvPr id="80" name="TextBox 79">
+            <a:extLst>
+              <a:ext uri="{FF2B5EF4-FFF2-40B4-BE49-F238E27FC236}">
+                <a16:creationId xmlns:a16="http://schemas.microsoft.com/office/drawing/2014/main" id="{5B5D440A-4807-9B44-B248-E03DE688C342}"/>
+              </a:ext>
+            </a:extLst>
+          </p:cNvPr>
+          <p:cNvSpPr txBox="1"/>
+          <p:nvPr/>
+        </p:nvSpPr>
+        <p:spPr>
+          <a:xfrm>
+            <a:off x="551584" y="379118"/>
+            <a:ext cx="1238031" cy="646331"/>
+          </a:xfrm>
+          <a:prstGeom prst="rect">
+            <a:avLst/>
+          </a:prstGeom>
+          <a:noFill/>
+        </p:spPr>
+        <p:txBody>
+          <a:bodyPr wrap="none" rtlCol="0">
+            <a:spAutoFit/>
+          </a:bodyPr>
+          <a:lstStyle/>
+          <a:p>
+            <a:pPr algn="ctr"/>
+            <a:r>
+              <a:rPr lang="en-GB" dirty="0">
+                <a:solidFill>
+                  <a:srgbClr val="0070C0"/>
+                </a:solidFill>
+              </a:rPr>
+              <a:t>Spectre de </a:t>
+            </a:r>
+          </a:p>
+          <a:p>
+            <a:pPr algn="ctr"/>
+            <a:r>
+              <a:rPr lang="en-GB" dirty="0">
+                <a:solidFill>
+                  <a:srgbClr val="0070C0"/>
+                </a:solidFill>
+              </a:rPr>
+              <a:t>puissance</a:t>
             </a:r>
           </a:p>
         </p:txBody>

</xml_diff>